<commit_message>
modified database design and solution
</commit_message>
<xml_diff>
--- a/design.pptx
+++ b/design.pptx
@@ -243,7 +243,7 @@
           <a:p>
             <a:fld id="{E76CD6B8-04C0-E547-B5EA-8CA5A66D36E2}" type="datetimeFigureOut">
               <a:rPr lang="en-US" smtClean="0"/>
-              <a:t>11/17/16</a:t>
+              <a:t>11/18/16</a:t>
             </a:fld>
             <a:endParaRPr lang="en-US"/>
           </a:p>
@@ -408,7 +408,7 @@
           <a:p>
             <a:fld id="{E76CD6B8-04C0-E547-B5EA-8CA5A66D36E2}" type="datetimeFigureOut">
               <a:rPr lang="en-US" smtClean="0"/>
-              <a:t>11/17/16</a:t>
+              <a:t>11/18/16</a:t>
             </a:fld>
             <a:endParaRPr lang="en-US"/>
           </a:p>
@@ -583,7 +583,7 @@
           <a:p>
             <a:fld id="{E76CD6B8-04C0-E547-B5EA-8CA5A66D36E2}" type="datetimeFigureOut">
               <a:rPr lang="en-US" smtClean="0"/>
-              <a:t>11/17/16</a:t>
+              <a:t>11/18/16</a:t>
             </a:fld>
             <a:endParaRPr lang="en-US"/>
           </a:p>
@@ -748,7 +748,7 @@
           <a:p>
             <a:fld id="{E76CD6B8-04C0-E547-B5EA-8CA5A66D36E2}" type="datetimeFigureOut">
               <a:rPr lang="en-US" smtClean="0"/>
-              <a:t>11/17/16</a:t>
+              <a:t>11/18/16</a:t>
             </a:fld>
             <a:endParaRPr lang="en-US"/>
           </a:p>
@@ -987,7 +987,7 @@
           <a:p>
             <a:fld id="{E76CD6B8-04C0-E547-B5EA-8CA5A66D36E2}" type="datetimeFigureOut">
               <a:rPr lang="en-US" smtClean="0"/>
-              <a:t>11/17/16</a:t>
+              <a:t>11/18/16</a:t>
             </a:fld>
             <a:endParaRPr lang="en-US"/>
           </a:p>
@@ -1214,7 +1214,7 @@
           <a:p>
             <a:fld id="{E76CD6B8-04C0-E547-B5EA-8CA5A66D36E2}" type="datetimeFigureOut">
               <a:rPr lang="en-US" smtClean="0"/>
-              <a:t>11/17/16</a:t>
+              <a:t>11/18/16</a:t>
             </a:fld>
             <a:endParaRPr lang="en-US"/>
           </a:p>
@@ -1576,7 +1576,7 @@
           <a:p>
             <a:fld id="{E76CD6B8-04C0-E547-B5EA-8CA5A66D36E2}" type="datetimeFigureOut">
               <a:rPr lang="en-US" smtClean="0"/>
-              <a:t>11/17/16</a:t>
+              <a:t>11/18/16</a:t>
             </a:fld>
             <a:endParaRPr lang="en-US"/>
           </a:p>
@@ -1689,7 +1689,7 @@
           <a:p>
             <a:fld id="{E76CD6B8-04C0-E547-B5EA-8CA5A66D36E2}" type="datetimeFigureOut">
               <a:rPr lang="en-US" smtClean="0"/>
-              <a:t>11/17/16</a:t>
+              <a:t>11/18/16</a:t>
             </a:fld>
             <a:endParaRPr lang="en-US"/>
           </a:p>
@@ -1779,7 +1779,7 @@
           <a:p>
             <a:fld id="{E76CD6B8-04C0-E547-B5EA-8CA5A66D36E2}" type="datetimeFigureOut">
               <a:rPr lang="en-US" smtClean="0"/>
-              <a:t>11/17/16</a:t>
+              <a:t>11/18/16</a:t>
             </a:fld>
             <a:endParaRPr lang="en-US"/>
           </a:p>
@@ -2051,7 +2051,7 @@
           <a:p>
             <a:fld id="{E76CD6B8-04C0-E547-B5EA-8CA5A66D36E2}" type="datetimeFigureOut">
               <a:rPr lang="en-US" smtClean="0"/>
-              <a:t>11/17/16</a:t>
+              <a:t>11/18/16</a:t>
             </a:fld>
             <a:endParaRPr lang="en-US"/>
           </a:p>
@@ -2303,7 +2303,7 @@
           <a:p>
             <a:fld id="{E76CD6B8-04C0-E547-B5EA-8CA5A66D36E2}" type="datetimeFigureOut">
               <a:rPr lang="en-US" smtClean="0"/>
-              <a:t>11/17/16</a:t>
+              <a:t>11/18/16</a:t>
             </a:fld>
             <a:endParaRPr lang="en-US"/>
           </a:p>
@@ -2511,7 +2511,7 @@
           <a:p>
             <a:fld id="{E76CD6B8-04C0-E547-B5EA-8CA5A66D36E2}" type="datetimeFigureOut">
               <a:rPr lang="en-US" smtClean="0"/>
-              <a:t>11/17/16</a:t>
+              <a:t>11/18/16</a:t>
             </a:fld>
             <a:endParaRPr lang="en-US"/>
           </a:p>
@@ -2918,342 +2918,6 @@
       </p:grpSpPr>
       <p:graphicFrame>
         <p:nvGraphicFramePr>
-          <p:cNvPr id="90" name="Table 89"/>
-          <p:cNvGraphicFramePr>
-            <a:graphicFrameLocks noGrp="1"/>
-          </p:cNvGraphicFramePr>
-          <p:nvPr>
-            <p:extLst>
-              <p:ext uri="{D42A27DB-BD31-4B8C-83A1-F6EECF244321}">
-                <p14:modId xmlns:p14="http://schemas.microsoft.com/office/powerpoint/2010/main" val="84300276"/>
-              </p:ext>
-            </p:extLst>
-          </p:nvPr>
-        </p:nvGraphicFramePr>
-        <p:xfrm>
-          <a:off x="4113633" y="4220470"/>
-          <a:ext cx="742729" cy="1741863"/>
-        </p:xfrm>
-        <a:graphic>
-          <a:graphicData uri="http://schemas.openxmlformats.org/drawingml/2006/table">
-            <a:tbl>
-              <a:tblPr firstRow="1" bandRow="1">
-                <a:tableStyleId>{F5AB1C69-6EDB-4FF4-983F-18BD219EF322}</a:tableStyleId>
-              </a:tblPr>
-              <a:tblGrid>
-                <a:gridCol w="742729"/>
-              </a:tblGrid>
-              <a:tr h="275285">
-                <a:tc>
-                  <a:txBody>
-                    <a:bodyPr/>
-                    <a:lstStyle/>
-                    <a:p>
-                      <a:r>
-                        <a:rPr lang="en-US" sz="1200" dirty="0" smtClean="0"/>
-                        <a:t>User</a:t>
-                      </a:r>
-                      <a:endParaRPr lang="en-US" sz="1200" dirty="0"/>
-                    </a:p>
-                  </a:txBody>
-                  <a:tcPr>
-                    <a:lnL w="12700" cap="flat" cmpd="sng" algn="ctr">
-                      <a:solidFill>
-                        <a:schemeClr val="tx1"/>
-                      </a:solidFill>
-                      <a:prstDash val="solid"/>
-                      <a:round/>
-                      <a:headEnd type="none" w="med" len="med"/>
-                      <a:tailEnd type="none" w="med" len="med"/>
-                    </a:lnL>
-                    <a:lnR w="12700" cap="flat" cmpd="sng" algn="ctr">
-                      <a:solidFill>
-                        <a:schemeClr val="tx1"/>
-                      </a:solidFill>
-                      <a:prstDash val="solid"/>
-                      <a:round/>
-                      <a:headEnd type="none" w="med" len="med"/>
-                      <a:tailEnd type="none" w="med" len="med"/>
-                    </a:lnR>
-                    <a:lnT w="12700" cap="flat" cmpd="sng" algn="ctr">
-                      <a:solidFill>
-                        <a:schemeClr val="tx1"/>
-                      </a:solidFill>
-                      <a:prstDash val="solid"/>
-                      <a:round/>
-                      <a:headEnd type="none" w="med" len="med"/>
-                      <a:tailEnd type="none" w="med" len="med"/>
-                    </a:lnT>
-                    <a:lnB w="12700" cap="flat" cmpd="sng" algn="ctr">
-                      <a:solidFill>
-                        <a:schemeClr val="tx1"/>
-                      </a:solidFill>
-                      <a:prstDash val="solid"/>
-                      <a:round/>
-                      <a:headEnd type="none" w="med" len="med"/>
-                      <a:tailEnd type="none" w="med" len="med"/>
-                    </a:lnB>
-                    <a:lnTlToBr w="12700" cmpd="sng">
-                      <a:noFill/>
-                      <a:prstDash val="solid"/>
-                    </a:lnTlToBr>
-                    <a:lnBlToTr w="12700" cmpd="sng">
-                      <a:noFill/>
-                      <a:prstDash val="solid"/>
-                    </a:lnBlToTr>
-                  </a:tcPr>
-                </a:tc>
-              </a:tr>
-              <a:tr h="458808">
-                <a:tc>
-                  <a:txBody>
-                    <a:bodyPr/>
-                    <a:lstStyle/>
-                    <a:p>
-                      <a:r>
-                        <a:rPr lang="en-US" sz="1200" u="sng" dirty="0" smtClean="0"/>
-                        <a:t>Login name</a:t>
-                      </a:r>
-                      <a:endParaRPr lang="en-US" sz="1200" u="sng" dirty="0"/>
-                    </a:p>
-                  </a:txBody>
-                  <a:tcPr>
-                    <a:lnL w="12700" cap="flat" cmpd="sng" algn="ctr">
-                      <a:solidFill>
-                        <a:schemeClr val="tx1"/>
-                      </a:solidFill>
-                      <a:prstDash val="solid"/>
-                      <a:round/>
-                      <a:headEnd type="none" w="med" len="med"/>
-                      <a:tailEnd type="none" w="med" len="med"/>
-                    </a:lnL>
-                    <a:lnR w="12700" cap="flat" cmpd="sng" algn="ctr">
-                      <a:solidFill>
-                        <a:schemeClr val="tx1"/>
-                      </a:solidFill>
-                      <a:prstDash val="solid"/>
-                      <a:round/>
-                      <a:headEnd type="none" w="med" len="med"/>
-                      <a:tailEnd type="none" w="med" len="med"/>
-                    </a:lnR>
-                    <a:lnT w="12700" cap="flat" cmpd="sng" algn="ctr">
-                      <a:solidFill>
-                        <a:schemeClr val="tx1"/>
-                      </a:solidFill>
-                      <a:prstDash val="solid"/>
-                      <a:round/>
-                      <a:headEnd type="none" w="med" len="med"/>
-                      <a:tailEnd type="none" w="med" len="med"/>
-                    </a:lnT>
-                    <a:lnB w="12700" cap="flat" cmpd="sng" algn="ctr">
-                      <a:solidFill>
-                        <a:schemeClr val="tx1"/>
-                      </a:solidFill>
-                      <a:prstDash val="solid"/>
-                      <a:round/>
-                      <a:headEnd type="none" w="med" len="med"/>
-                      <a:tailEnd type="none" w="med" len="med"/>
-                    </a:lnB>
-                    <a:lnTlToBr w="12700" cmpd="sng">
-                      <a:noFill/>
-                      <a:prstDash val="solid"/>
-                    </a:lnTlToBr>
-                    <a:lnBlToTr w="12700" cmpd="sng">
-                      <a:noFill/>
-                      <a:prstDash val="solid"/>
-                    </a:lnBlToTr>
-                  </a:tcPr>
-                </a:tc>
-              </a:tr>
-              <a:tr h="275285">
-                <a:tc>
-                  <a:txBody>
-                    <a:bodyPr/>
-                    <a:lstStyle/>
-                    <a:p>
-                      <a:r>
-                        <a:rPr lang="en-US" sz="1200" dirty="0" smtClean="0"/>
-                        <a:t>profile</a:t>
-                      </a:r>
-                      <a:endParaRPr lang="en-US" sz="1200" dirty="0"/>
-                    </a:p>
-                  </a:txBody>
-                  <a:tcPr>
-                    <a:lnL w="12700" cap="flat" cmpd="sng" algn="ctr">
-                      <a:solidFill>
-                        <a:schemeClr val="tx1"/>
-                      </a:solidFill>
-                      <a:prstDash val="solid"/>
-                      <a:round/>
-                      <a:headEnd type="none" w="med" len="med"/>
-                      <a:tailEnd type="none" w="med" len="med"/>
-                    </a:lnL>
-                    <a:lnR w="12700" cap="flat" cmpd="sng" algn="ctr">
-                      <a:solidFill>
-                        <a:schemeClr val="tx1"/>
-                      </a:solidFill>
-                      <a:prstDash val="solid"/>
-                      <a:round/>
-                      <a:headEnd type="none" w="med" len="med"/>
-                      <a:tailEnd type="none" w="med" len="med"/>
-                    </a:lnR>
-                    <a:lnT w="12700" cap="flat" cmpd="sng" algn="ctr">
-                      <a:solidFill>
-                        <a:schemeClr val="tx1"/>
-                      </a:solidFill>
-                      <a:prstDash val="solid"/>
-                      <a:round/>
-                      <a:headEnd type="none" w="med" len="med"/>
-                      <a:tailEnd type="none" w="med" len="med"/>
-                    </a:lnT>
-                    <a:lnB w="12700" cap="flat" cmpd="sng" algn="ctr">
-                      <a:solidFill>
-                        <a:schemeClr val="tx1"/>
-                      </a:solidFill>
-                      <a:prstDash val="solid"/>
-                      <a:round/>
-                      <a:headEnd type="none" w="med" len="med"/>
-                      <a:tailEnd type="none" w="med" len="med"/>
-                    </a:lnB>
-                    <a:lnTlToBr w="12700" cmpd="sng">
-                      <a:noFill/>
-                      <a:prstDash val="solid"/>
-                    </a:lnTlToBr>
-                    <a:lnBlToTr w="12700" cmpd="sng">
-                      <a:noFill/>
-                      <a:prstDash val="solid"/>
-                    </a:lnBlToTr>
-                  </a:tcPr>
-                </a:tc>
-              </a:tr>
-              <a:tr h="275285">
-                <a:tc>
-                  <a:txBody>
-                    <a:bodyPr/>
-                    <a:lstStyle/>
-                    <a:p>
-                      <a:r>
-                        <a:rPr lang="en-US" sz="1200" dirty="0" smtClean="0"/>
-                        <a:t>name</a:t>
-                      </a:r>
-                      <a:endParaRPr lang="en-US" sz="1200" dirty="0"/>
-                    </a:p>
-                  </a:txBody>
-                  <a:tcPr>
-                    <a:lnL w="12700" cap="flat" cmpd="sng" algn="ctr">
-                      <a:solidFill>
-                        <a:schemeClr val="tx1"/>
-                      </a:solidFill>
-                      <a:prstDash val="solid"/>
-                      <a:round/>
-                      <a:headEnd type="none" w="med" len="med"/>
-                      <a:tailEnd type="none" w="med" len="med"/>
-                    </a:lnL>
-                    <a:lnR w="12700" cap="flat" cmpd="sng" algn="ctr">
-                      <a:solidFill>
-                        <a:schemeClr val="tx1"/>
-                      </a:solidFill>
-                      <a:prstDash val="solid"/>
-                      <a:round/>
-                      <a:headEnd type="none" w="med" len="med"/>
-                      <a:tailEnd type="none" w="med" len="med"/>
-                    </a:lnR>
-                    <a:lnT w="12700" cap="flat" cmpd="sng" algn="ctr">
-                      <a:solidFill>
-                        <a:schemeClr val="tx1"/>
-                      </a:solidFill>
-                      <a:prstDash val="solid"/>
-                      <a:round/>
-                      <a:headEnd type="none" w="med" len="med"/>
-                      <a:tailEnd type="none" w="med" len="med"/>
-                    </a:lnT>
-                    <a:lnB w="12700" cap="flat" cmpd="sng" algn="ctr">
-                      <a:solidFill>
-                        <a:schemeClr val="tx1"/>
-                      </a:solidFill>
-                      <a:prstDash val="solid"/>
-                      <a:round/>
-                      <a:headEnd type="none" w="med" len="med"/>
-                      <a:tailEnd type="none" w="med" len="med"/>
-                    </a:lnB>
-                    <a:lnTlToBr w="12700" cmpd="sng">
-                      <a:noFill/>
-                      <a:prstDash val="solid"/>
-                    </a:lnTlToBr>
-                    <a:lnBlToTr w="12700" cmpd="sng">
-                      <a:noFill/>
-                      <a:prstDash val="solid"/>
-                    </a:lnBlToTr>
-                  </a:tcPr>
-                </a:tc>
-              </a:tr>
-              <a:tr h="275285">
-                <a:tc>
-                  <a:txBody>
-                    <a:bodyPr/>
-                    <a:lstStyle/>
-                    <a:p>
-                      <a:r>
-                        <a:rPr lang="en-US" sz="1200" dirty="0" smtClean="0"/>
-                        <a:t>password</a:t>
-                      </a:r>
-                      <a:endParaRPr lang="en-US" sz="1200" dirty="0"/>
-                    </a:p>
-                  </a:txBody>
-                  <a:tcPr>
-                    <a:lnL w="12700" cap="flat" cmpd="sng" algn="ctr">
-                      <a:solidFill>
-                        <a:schemeClr val="tx1"/>
-                      </a:solidFill>
-                      <a:prstDash val="solid"/>
-                      <a:round/>
-                      <a:headEnd type="none" w="med" len="med"/>
-                      <a:tailEnd type="none" w="med" len="med"/>
-                    </a:lnL>
-                    <a:lnR w="12700" cap="flat" cmpd="sng" algn="ctr">
-                      <a:solidFill>
-                        <a:schemeClr val="tx1"/>
-                      </a:solidFill>
-                      <a:prstDash val="solid"/>
-                      <a:round/>
-                      <a:headEnd type="none" w="med" len="med"/>
-                      <a:tailEnd type="none" w="med" len="med"/>
-                    </a:lnR>
-                    <a:lnT w="12700" cap="flat" cmpd="sng" algn="ctr">
-                      <a:solidFill>
-                        <a:schemeClr val="tx1"/>
-                      </a:solidFill>
-                      <a:prstDash val="solid"/>
-                      <a:round/>
-                      <a:headEnd type="none" w="med" len="med"/>
-                      <a:tailEnd type="none" w="med" len="med"/>
-                    </a:lnT>
-                    <a:lnB w="12700" cap="flat" cmpd="sng" algn="ctr">
-                      <a:solidFill>
-                        <a:schemeClr val="tx1"/>
-                      </a:solidFill>
-                      <a:prstDash val="solid"/>
-                      <a:round/>
-                      <a:headEnd type="none" w="med" len="med"/>
-                      <a:tailEnd type="none" w="med" len="med"/>
-                    </a:lnB>
-                    <a:lnTlToBr w="12700" cmpd="sng">
-                      <a:noFill/>
-                      <a:prstDash val="solid"/>
-                    </a:lnTlToBr>
-                    <a:lnBlToTr w="12700" cmpd="sng">
-                      <a:noFill/>
-                      <a:prstDash val="solid"/>
-                    </a:lnBlToTr>
-                  </a:tcPr>
-                </a:tc>
-              </a:tr>
-            </a:tbl>
-          </a:graphicData>
-        </a:graphic>
-      </p:graphicFrame>
-      <p:graphicFrame>
-        <p:nvGraphicFramePr>
           <p:cNvPr id="91" name="Table 90"/>
           <p:cNvGraphicFramePr>
             <a:graphicFrameLocks noGrp="1"/>
@@ -3548,161 +3212,6 @@
           </a:graphicData>
         </a:graphic>
       </p:graphicFrame>
-      <p:grpSp>
-        <p:nvGrpSpPr>
-          <p:cNvPr id="92" name="Group 91"/>
-          <p:cNvGrpSpPr/>
-          <p:nvPr/>
-        </p:nvGrpSpPr>
-        <p:grpSpPr>
-          <a:xfrm>
-            <a:off x="4856362" y="4365455"/>
-            <a:ext cx="1857701" cy="532993"/>
-            <a:chOff x="1376620" y="2211872"/>
-            <a:chExt cx="1857701" cy="532993"/>
-          </a:xfrm>
-        </p:grpSpPr>
-        <p:sp>
-          <p:nvSpPr>
-            <p:cNvPr id="93" name="Rectangle 92"/>
-            <p:cNvSpPr/>
-            <p:nvPr/>
-          </p:nvSpPr>
-          <p:spPr>
-            <a:xfrm rot="2700000">
-              <a:off x="1968706" y="2211872"/>
-              <a:ext cx="532993" cy="532993"/>
-            </a:xfrm>
-            <a:prstGeom prst="rect">
-              <a:avLst/>
-            </a:prstGeom>
-            <a:solidFill>
-              <a:schemeClr val="bg2"/>
-            </a:solidFill>
-            <a:ln>
-              <a:solidFill>
-                <a:schemeClr val="accent1"/>
-              </a:solidFill>
-            </a:ln>
-          </p:spPr>
-          <p:style>
-            <a:lnRef idx="2">
-              <a:schemeClr val="accent1">
-                <a:shade val="50000"/>
-              </a:schemeClr>
-            </a:lnRef>
-            <a:fillRef idx="1">
-              <a:schemeClr val="accent1"/>
-            </a:fillRef>
-            <a:effectRef idx="0">
-              <a:schemeClr val="accent1"/>
-            </a:effectRef>
-            <a:fontRef idx="minor">
-              <a:schemeClr val="lt1"/>
-            </a:fontRef>
-          </p:style>
-          <p:txBody>
-            <a:bodyPr rtlCol="0" anchor="ctr"/>
-            <a:lstStyle/>
-            <a:p>
-              <a:pPr algn="ctr"/>
-              <a:endParaRPr lang="en-US"/>
-            </a:p>
-          </p:txBody>
-        </p:sp>
-        <p:sp>
-          <p:nvSpPr>
-            <p:cNvPr id="94" name="TextBox 93"/>
-            <p:cNvSpPr txBox="1"/>
-            <p:nvPr/>
-          </p:nvSpPr>
-          <p:spPr>
-            <a:xfrm>
-              <a:off x="2006644" y="2329467"/>
-              <a:ext cx="457113" cy="276999"/>
-            </a:xfrm>
-            <a:prstGeom prst="rect">
-              <a:avLst/>
-            </a:prstGeom>
-            <a:noFill/>
-          </p:spPr>
-          <p:txBody>
-            <a:bodyPr wrap="none" rtlCol="0">
-              <a:spAutoFit/>
-            </a:bodyPr>
-            <a:lstStyle/>
-            <a:p>
-              <a:r>
-                <a:rPr lang="en-US" sz="1200" dirty="0" smtClean="0"/>
-                <a:t>post</a:t>
-              </a:r>
-              <a:endParaRPr lang="en-US" sz="1200" dirty="0"/>
-            </a:p>
-          </p:txBody>
-        </p:sp>
-        <p:cxnSp>
-          <p:nvCxnSpPr>
-            <p:cNvPr id="95" name="Straight Connector 94"/>
-            <p:cNvCxnSpPr/>
-            <p:nvPr/>
-          </p:nvCxnSpPr>
-          <p:spPr>
-            <a:xfrm flipV="1">
-              <a:off x="1376620" y="2478368"/>
-              <a:ext cx="490167" cy="1"/>
-            </a:xfrm>
-            <a:prstGeom prst="line">
-              <a:avLst/>
-            </a:prstGeom>
-            <a:ln w="15875"/>
-          </p:spPr>
-          <p:style>
-            <a:lnRef idx="1">
-              <a:schemeClr val="accent1"/>
-            </a:lnRef>
-            <a:fillRef idx="0">
-              <a:schemeClr val="accent1"/>
-            </a:fillRef>
-            <a:effectRef idx="0">
-              <a:schemeClr val="accent1"/>
-            </a:effectRef>
-            <a:fontRef idx="minor">
-              <a:schemeClr val="tx1"/>
-            </a:fontRef>
-          </p:style>
-        </p:cxnSp>
-        <p:cxnSp>
-          <p:nvCxnSpPr>
-            <p:cNvPr id="96" name="Straight Connector 95"/>
-            <p:cNvCxnSpPr/>
-            <p:nvPr/>
-          </p:nvCxnSpPr>
-          <p:spPr>
-            <a:xfrm>
-              <a:off x="2612086" y="2478368"/>
-              <a:ext cx="622235" cy="0"/>
-            </a:xfrm>
-            <a:prstGeom prst="line">
-              <a:avLst/>
-            </a:prstGeom>
-            <a:ln w="15875"/>
-          </p:spPr>
-          <p:style>
-            <a:lnRef idx="1">
-              <a:schemeClr val="accent1"/>
-            </a:lnRef>
-            <a:fillRef idx="0">
-              <a:schemeClr val="accent1"/>
-            </a:fillRef>
-            <a:effectRef idx="0">
-              <a:schemeClr val="accent1"/>
-            </a:effectRef>
-            <a:fontRef idx="minor">
-              <a:schemeClr val="tx1"/>
-            </a:fontRef>
-          </p:style>
-        </p:cxnSp>
-      </p:grpSp>
       <p:graphicFrame>
         <p:nvGraphicFramePr>
           <p:cNvPr id="97" name="Table 96"/>
@@ -8874,14 +8383,14 @@
           <p:nvPr>
             <p:extLst>
               <p:ext uri="{D42A27DB-BD31-4B8C-83A1-F6EECF244321}">
-                <p14:modId xmlns:p14="http://schemas.microsoft.com/office/powerpoint/2010/main" val="622518095"/>
+                <p14:modId xmlns:p14="http://schemas.microsoft.com/office/powerpoint/2010/main" val="247477308"/>
               </p:ext>
             </p:extLst>
           </p:nvPr>
         </p:nvGraphicFramePr>
         <p:xfrm>
-          <a:off x="3302203" y="7239488"/>
-          <a:ext cx="1273658" cy="822960"/>
+          <a:off x="3302202" y="7239488"/>
+          <a:ext cx="1448683" cy="822960"/>
         </p:xfrm>
         <a:graphic>
           <a:graphicData uri="http://schemas.openxmlformats.org/drawingml/2006/table">
@@ -8890,7 +8399,7 @@
                 <a:tableStyleId>{F5AB1C69-6EDB-4FF4-983F-18BD219EF322}</a:tableStyleId>
               </a:tblPr>
               <a:tblGrid>
-                <a:gridCol w="1273658"/>
+                <a:gridCol w="1448683"/>
               </a:tblGrid>
               <a:tr h="240960">
                 <a:tc>
@@ -9023,7 +8532,7 @@
                       </a:pPr>
                       <a:r>
                         <a:rPr lang="en-US" sz="1200" dirty="0" err="1" smtClean="0"/>
-                        <a:t>unit_in_grams</a:t>
+                        <a:t>quantity_in_grams</a:t>
                       </a:r>
                       <a:endParaRPr lang="en-US" sz="1200" dirty="0"/>
                     </a:p>
@@ -9065,6 +8574,652 @@
                       <a:headEnd type="none" w="med" len="med"/>
                       <a:tailEnd type="none" w="med" len="med"/>
                     </a:lnB>
+                  </a:tcPr>
+                </a:tc>
+              </a:tr>
+            </a:tbl>
+          </a:graphicData>
+        </a:graphic>
+      </p:graphicFrame>
+      <p:grpSp>
+        <p:nvGrpSpPr>
+          <p:cNvPr id="130" name="Group 129"/>
+          <p:cNvGrpSpPr/>
+          <p:nvPr/>
+        </p:nvGrpSpPr>
+        <p:grpSpPr>
+          <a:xfrm>
+            <a:off x="4856362" y="4365455"/>
+            <a:ext cx="1847972" cy="532993"/>
+            <a:chOff x="4856362" y="4365455"/>
+            <a:chExt cx="1847972" cy="532993"/>
+          </a:xfrm>
+        </p:grpSpPr>
+        <p:grpSp>
+          <p:nvGrpSpPr>
+            <p:cNvPr id="137" name="Group 136"/>
+            <p:cNvGrpSpPr/>
+            <p:nvPr/>
+          </p:nvGrpSpPr>
+          <p:grpSpPr>
+            <a:xfrm>
+              <a:off x="4856362" y="4365455"/>
+              <a:ext cx="1125079" cy="532993"/>
+              <a:chOff x="4856362" y="4365455"/>
+              <a:chExt cx="1125079" cy="532993"/>
+            </a:xfrm>
+          </p:grpSpPr>
+          <p:grpSp>
+            <p:nvGrpSpPr>
+              <p:cNvPr id="141" name="Group 140"/>
+              <p:cNvGrpSpPr/>
+              <p:nvPr/>
+            </p:nvGrpSpPr>
+            <p:grpSpPr>
+              <a:xfrm>
+                <a:off x="5448448" y="4365455"/>
+                <a:ext cx="532993" cy="532993"/>
+                <a:chOff x="1968706" y="2211872"/>
+                <a:chExt cx="532993" cy="532993"/>
+              </a:xfrm>
+            </p:grpSpPr>
+            <p:sp>
+              <p:nvSpPr>
+                <p:cNvPr id="143" name="Rectangle 142"/>
+                <p:cNvSpPr/>
+                <p:nvPr/>
+              </p:nvSpPr>
+              <p:spPr>
+                <a:xfrm rot="2700000">
+                  <a:off x="1968706" y="2211872"/>
+                  <a:ext cx="532993" cy="532993"/>
+                </a:xfrm>
+                <a:prstGeom prst="rect">
+                  <a:avLst/>
+                </a:prstGeom>
+                <a:solidFill>
+                  <a:schemeClr val="bg2"/>
+                </a:solidFill>
+                <a:ln>
+                  <a:solidFill>
+                    <a:schemeClr val="accent1"/>
+                  </a:solidFill>
+                </a:ln>
+              </p:spPr>
+              <p:style>
+                <a:lnRef idx="2">
+                  <a:schemeClr val="accent1">
+                    <a:shade val="50000"/>
+                  </a:schemeClr>
+                </a:lnRef>
+                <a:fillRef idx="1">
+                  <a:schemeClr val="accent1"/>
+                </a:fillRef>
+                <a:effectRef idx="0">
+                  <a:schemeClr val="accent1"/>
+                </a:effectRef>
+                <a:fontRef idx="minor">
+                  <a:schemeClr val="lt1"/>
+                </a:fontRef>
+              </p:style>
+              <p:txBody>
+                <a:bodyPr rtlCol="0" anchor="ctr"/>
+                <a:lstStyle/>
+                <a:p>
+                  <a:pPr algn="ctr"/>
+                  <a:endParaRPr lang="en-US"/>
+                </a:p>
+              </p:txBody>
+            </p:sp>
+            <p:sp>
+              <p:nvSpPr>
+                <p:cNvPr id="153" name="TextBox 152"/>
+                <p:cNvSpPr txBox="1"/>
+                <p:nvPr/>
+              </p:nvSpPr>
+              <p:spPr>
+                <a:xfrm>
+                  <a:off x="2006644" y="2329467"/>
+                  <a:ext cx="457113" cy="276999"/>
+                </a:xfrm>
+                <a:prstGeom prst="rect">
+                  <a:avLst/>
+                </a:prstGeom>
+                <a:noFill/>
+              </p:spPr>
+              <p:txBody>
+                <a:bodyPr wrap="none" rtlCol="0">
+                  <a:spAutoFit/>
+                </a:bodyPr>
+                <a:lstStyle/>
+                <a:p>
+                  <a:r>
+                    <a:rPr lang="en-US" sz="1200" dirty="0" smtClean="0"/>
+                    <a:t>post</a:t>
+                  </a:r>
+                  <a:endParaRPr lang="en-US" sz="1200" dirty="0"/>
+                </a:p>
+              </p:txBody>
+            </p:sp>
+          </p:grpSp>
+          <p:cxnSp>
+            <p:nvCxnSpPr>
+              <p:cNvPr id="142" name="Straight Arrow Connector 141"/>
+              <p:cNvCxnSpPr/>
+              <p:nvPr/>
+            </p:nvCxnSpPr>
+            <p:spPr>
+              <a:xfrm flipH="1" flipV="1">
+                <a:off x="4856362" y="4631952"/>
+                <a:ext cx="476857" cy="3500"/>
+              </a:xfrm>
+              <a:prstGeom prst="straightConnector1">
+                <a:avLst/>
+              </a:prstGeom>
+              <a:ln w="15875">
+                <a:tailEnd type="triangle"/>
+              </a:ln>
+            </p:spPr>
+            <p:style>
+              <a:lnRef idx="1">
+                <a:schemeClr val="accent1"/>
+              </a:lnRef>
+              <a:fillRef idx="0">
+                <a:schemeClr val="accent1"/>
+              </a:fillRef>
+              <a:effectRef idx="0">
+                <a:schemeClr val="accent1"/>
+              </a:effectRef>
+              <a:fontRef idx="minor">
+                <a:schemeClr val="tx1"/>
+              </a:fontRef>
+            </p:style>
+          </p:cxnSp>
+        </p:grpSp>
+        <p:grpSp>
+          <p:nvGrpSpPr>
+            <p:cNvPr id="138" name="Group 137"/>
+            <p:cNvGrpSpPr/>
+            <p:nvPr/>
+          </p:nvGrpSpPr>
+          <p:grpSpPr>
+            <a:xfrm rot="5400000">
+              <a:off x="6369347" y="4316692"/>
+              <a:ext cx="45719" cy="624254"/>
+              <a:chOff x="4787083" y="5327906"/>
+              <a:chExt cx="31837" cy="439423"/>
+            </a:xfrm>
+          </p:grpSpPr>
+          <p:cxnSp>
+            <p:nvCxnSpPr>
+              <p:cNvPr id="139" name="Straight Connector 138"/>
+              <p:cNvCxnSpPr/>
+              <p:nvPr/>
+            </p:nvCxnSpPr>
+            <p:spPr>
+              <a:xfrm rot="16175274">
+                <a:off x="4599209" y="5547618"/>
+                <a:ext cx="439422" cy="0"/>
+              </a:xfrm>
+              <a:prstGeom prst="line">
+                <a:avLst/>
+              </a:prstGeom>
+              <a:ln w="15875"/>
+            </p:spPr>
+            <p:style>
+              <a:lnRef idx="1">
+                <a:schemeClr val="accent1"/>
+              </a:lnRef>
+              <a:fillRef idx="0">
+                <a:schemeClr val="accent1"/>
+              </a:fillRef>
+              <a:effectRef idx="0">
+                <a:schemeClr val="accent1"/>
+              </a:effectRef>
+              <a:fontRef idx="minor">
+                <a:schemeClr val="tx1"/>
+              </a:fontRef>
+            </p:style>
+          </p:cxnSp>
+          <p:cxnSp>
+            <p:nvCxnSpPr>
+              <p:cNvPr id="140" name="Straight Connector 139"/>
+              <p:cNvCxnSpPr/>
+              <p:nvPr/>
+            </p:nvCxnSpPr>
+            <p:spPr>
+              <a:xfrm rot="16175274">
+                <a:off x="4567372" y="5547617"/>
+                <a:ext cx="439422" cy="0"/>
+              </a:xfrm>
+              <a:prstGeom prst="line">
+                <a:avLst/>
+              </a:prstGeom>
+              <a:ln w="15875"/>
+            </p:spPr>
+            <p:style>
+              <a:lnRef idx="1">
+                <a:schemeClr val="accent1"/>
+              </a:lnRef>
+              <a:fillRef idx="0">
+                <a:schemeClr val="accent1"/>
+              </a:fillRef>
+              <a:effectRef idx="0">
+                <a:schemeClr val="accent1"/>
+              </a:effectRef>
+              <a:fontRef idx="minor">
+                <a:schemeClr val="tx1"/>
+              </a:fontRef>
+            </p:style>
+          </p:cxnSp>
+        </p:grpSp>
+      </p:grpSp>
+      <p:graphicFrame>
+        <p:nvGraphicFramePr>
+          <p:cNvPr id="154" name="Table 153"/>
+          <p:cNvGraphicFramePr>
+            <a:graphicFrameLocks noGrp="1"/>
+          </p:cNvGraphicFramePr>
+          <p:nvPr>
+            <p:extLst>
+              <p:ext uri="{D42A27DB-BD31-4B8C-83A1-F6EECF244321}">
+                <p14:modId xmlns:p14="http://schemas.microsoft.com/office/powerpoint/2010/main" val="1618806641"/>
+              </p:ext>
+            </p:extLst>
+          </p:nvPr>
+        </p:nvGraphicFramePr>
+        <p:xfrm>
+          <a:off x="3993064" y="4237091"/>
+          <a:ext cx="862716" cy="1650745"/>
+        </p:xfrm>
+        <a:graphic>
+          <a:graphicData uri="http://schemas.openxmlformats.org/drawingml/2006/table">
+            <a:tbl>
+              <a:tblPr firstRow="1" bandRow="1">
+                <a:tableStyleId>{F5AB1C69-6EDB-4FF4-983F-18BD219EF322}</a:tableStyleId>
+              </a:tblPr>
+              <a:tblGrid>
+                <a:gridCol w="862716"/>
+              </a:tblGrid>
+              <a:tr h="275285">
+                <a:tc>
+                  <a:txBody>
+                    <a:bodyPr/>
+                    <a:lstStyle/>
+                    <a:p>
+                      <a:r>
+                        <a:rPr lang="en-US" sz="1200" dirty="0" smtClean="0"/>
+                        <a:t>User</a:t>
+                      </a:r>
+                      <a:endParaRPr lang="en-US" sz="1200" dirty="0"/>
+                    </a:p>
+                  </a:txBody>
+                  <a:tcPr>
+                    <a:lnL w="12700" cap="flat" cmpd="sng" algn="ctr">
+                      <a:solidFill>
+                        <a:schemeClr val="tx1"/>
+                      </a:solidFill>
+                      <a:prstDash val="solid"/>
+                      <a:round/>
+                      <a:headEnd type="none" w="med" len="med"/>
+                      <a:tailEnd type="none" w="med" len="med"/>
+                    </a:lnL>
+                    <a:lnR w="12700" cap="flat" cmpd="sng" algn="ctr">
+                      <a:solidFill>
+                        <a:schemeClr val="tx1"/>
+                      </a:solidFill>
+                      <a:prstDash val="solid"/>
+                      <a:round/>
+                      <a:headEnd type="none" w="med" len="med"/>
+                      <a:tailEnd type="none" w="med" len="med"/>
+                    </a:lnR>
+                    <a:lnT w="12700" cap="flat" cmpd="sng" algn="ctr">
+                      <a:solidFill>
+                        <a:schemeClr val="tx1"/>
+                      </a:solidFill>
+                      <a:prstDash val="solid"/>
+                      <a:round/>
+                      <a:headEnd type="none" w="med" len="med"/>
+                      <a:tailEnd type="none" w="med" len="med"/>
+                    </a:lnT>
+                    <a:lnB w="12700" cap="flat" cmpd="sng" algn="ctr">
+                      <a:solidFill>
+                        <a:schemeClr val="tx1"/>
+                      </a:solidFill>
+                      <a:prstDash val="solid"/>
+                      <a:round/>
+                      <a:headEnd type="none" w="med" len="med"/>
+                      <a:tailEnd type="none" w="med" len="med"/>
+                    </a:lnB>
+                    <a:lnTlToBr w="12700" cmpd="sng">
+                      <a:noFill/>
+                      <a:prstDash val="solid"/>
+                    </a:lnTlToBr>
+                    <a:lnBlToTr w="12700" cmpd="sng">
+                      <a:noFill/>
+                      <a:prstDash val="solid"/>
+                    </a:lnBlToTr>
+                  </a:tcPr>
+                </a:tc>
+              </a:tr>
+              <a:tr h="154302">
+                <a:tc>
+                  <a:txBody>
+                    <a:bodyPr/>
+                    <a:lstStyle/>
+                    <a:p>
+                      <a:r>
+                        <a:rPr lang="en-US" sz="1200" u="sng" dirty="0" err="1" smtClean="0"/>
+                        <a:t>uid</a:t>
+                      </a:r>
+                      <a:endParaRPr lang="en-US" sz="1200" u="sng" dirty="0"/>
+                    </a:p>
+                  </a:txBody>
+                  <a:tcPr>
+                    <a:lnL w="12700" cap="flat" cmpd="sng" algn="ctr">
+                      <a:solidFill>
+                        <a:schemeClr val="tx1"/>
+                      </a:solidFill>
+                      <a:prstDash val="solid"/>
+                      <a:round/>
+                      <a:headEnd type="none" w="med" len="med"/>
+                      <a:tailEnd type="none" w="med" len="med"/>
+                    </a:lnL>
+                    <a:lnR w="12700" cap="flat" cmpd="sng" algn="ctr">
+                      <a:solidFill>
+                        <a:schemeClr val="tx1"/>
+                      </a:solidFill>
+                      <a:prstDash val="solid"/>
+                      <a:round/>
+                      <a:headEnd type="none" w="med" len="med"/>
+                      <a:tailEnd type="none" w="med" len="med"/>
+                    </a:lnR>
+                    <a:lnT w="12700" cap="flat" cmpd="sng" algn="ctr">
+                      <a:solidFill>
+                        <a:schemeClr val="tx1"/>
+                      </a:solidFill>
+                      <a:prstDash val="solid"/>
+                      <a:round/>
+                      <a:headEnd type="none" w="med" len="med"/>
+                      <a:tailEnd type="none" w="med" len="med"/>
+                    </a:lnT>
+                    <a:lnB w="12700" cap="flat" cmpd="sng" algn="ctr">
+                      <a:solidFill>
+                        <a:schemeClr val="tx1"/>
+                      </a:solidFill>
+                      <a:prstDash val="solid"/>
+                      <a:round/>
+                      <a:headEnd type="none" w="med" len="med"/>
+                      <a:tailEnd type="none" w="med" len="med"/>
+                    </a:lnB>
+                    <a:lnTlToBr w="12700" cmpd="sng">
+                      <a:noFill/>
+                      <a:prstDash val="solid"/>
+                    </a:lnTlToBr>
+                    <a:lnBlToTr w="12700" cmpd="sng">
+                      <a:noFill/>
+                      <a:prstDash val="solid"/>
+                    </a:lnBlToTr>
+                  </a:tcPr>
+                </a:tc>
+              </a:tr>
+              <a:tr h="275285">
+                <a:tc>
+                  <a:txBody>
+                    <a:bodyPr/>
+                    <a:lstStyle/>
+                    <a:p>
+                      <a:r>
+                        <a:rPr lang="en-US" sz="1200" dirty="0" err="1" smtClean="0"/>
+                        <a:t>uname</a:t>
+                      </a:r>
+                      <a:endParaRPr lang="en-US" sz="1200" dirty="0"/>
+                    </a:p>
+                  </a:txBody>
+                  <a:tcPr>
+                    <a:lnL w="12700" cap="flat" cmpd="sng" algn="ctr">
+                      <a:solidFill>
+                        <a:schemeClr val="tx1"/>
+                      </a:solidFill>
+                      <a:prstDash val="solid"/>
+                      <a:round/>
+                      <a:headEnd type="none" w="med" len="med"/>
+                      <a:tailEnd type="none" w="med" len="med"/>
+                    </a:lnL>
+                    <a:lnR w="12700" cap="flat" cmpd="sng" algn="ctr">
+                      <a:solidFill>
+                        <a:schemeClr val="tx1"/>
+                      </a:solidFill>
+                      <a:prstDash val="solid"/>
+                      <a:round/>
+                      <a:headEnd type="none" w="med" len="med"/>
+                      <a:tailEnd type="none" w="med" len="med"/>
+                    </a:lnR>
+                    <a:lnT w="12700" cap="flat" cmpd="sng" algn="ctr">
+                      <a:solidFill>
+                        <a:schemeClr val="tx1"/>
+                      </a:solidFill>
+                      <a:prstDash val="solid"/>
+                      <a:round/>
+                      <a:headEnd type="none" w="med" len="med"/>
+                      <a:tailEnd type="none" w="med" len="med"/>
+                    </a:lnT>
+                    <a:lnB w="12700" cap="flat" cmpd="sng" algn="ctr">
+                      <a:solidFill>
+                        <a:schemeClr val="tx1"/>
+                      </a:solidFill>
+                      <a:prstDash val="solid"/>
+                      <a:round/>
+                      <a:headEnd type="none" w="med" len="med"/>
+                      <a:tailEnd type="none" w="med" len="med"/>
+                    </a:lnB>
+                    <a:lnTlToBr w="12700" cmpd="sng">
+                      <a:noFill/>
+                      <a:prstDash val="solid"/>
+                    </a:lnTlToBr>
+                    <a:lnBlToTr w="12700" cmpd="sng">
+                      <a:noFill/>
+                      <a:prstDash val="solid"/>
+                    </a:lnBlToTr>
+                  </a:tcPr>
+                </a:tc>
+              </a:tr>
+              <a:tr h="275285">
+                <a:tc>
+                  <a:txBody>
+                    <a:bodyPr/>
+                    <a:lstStyle/>
+                    <a:p>
+                      <a:pPr marL="0" marR="0" indent="0" algn="l" defTabSz="1097280" rtl="0" eaLnBrk="1" fontAlgn="auto" latinLnBrk="0" hangingPunct="1">
+                        <a:lnSpc>
+                          <a:spcPct val="100000"/>
+                        </a:lnSpc>
+                        <a:spcBef>
+                          <a:spcPts val="0"/>
+                        </a:spcBef>
+                        <a:spcAft>
+                          <a:spcPts val="0"/>
+                        </a:spcAft>
+                        <a:buClrTx/>
+                        <a:buSzTx/>
+                        <a:buFontTx/>
+                        <a:buNone/>
+                        <a:tabLst/>
+                        <a:defRPr/>
+                      </a:pPr>
+                      <a:r>
+                        <a:rPr lang="en-US" sz="1200" dirty="0" smtClean="0"/>
+                        <a:t>password</a:t>
+                      </a:r>
+                    </a:p>
+                  </a:txBody>
+                  <a:tcPr>
+                    <a:lnL w="12700" cap="flat" cmpd="sng" algn="ctr">
+                      <a:solidFill>
+                        <a:schemeClr val="tx1"/>
+                      </a:solidFill>
+                      <a:prstDash val="solid"/>
+                      <a:round/>
+                      <a:headEnd type="none" w="med" len="med"/>
+                      <a:tailEnd type="none" w="med" len="med"/>
+                    </a:lnL>
+                    <a:lnR w="12700" cap="flat" cmpd="sng" algn="ctr">
+                      <a:solidFill>
+                        <a:schemeClr val="tx1"/>
+                      </a:solidFill>
+                      <a:prstDash val="solid"/>
+                      <a:round/>
+                      <a:headEnd type="none" w="med" len="med"/>
+                      <a:tailEnd type="none" w="med" len="med"/>
+                    </a:lnR>
+                    <a:lnT w="12700" cap="flat" cmpd="sng" algn="ctr">
+                      <a:solidFill>
+                        <a:schemeClr val="tx1"/>
+                      </a:solidFill>
+                      <a:prstDash val="solid"/>
+                      <a:round/>
+                      <a:headEnd type="none" w="med" len="med"/>
+                      <a:tailEnd type="none" w="med" len="med"/>
+                    </a:lnT>
+                    <a:lnB w="12700" cap="flat" cmpd="sng" algn="ctr">
+                      <a:solidFill>
+                        <a:schemeClr val="tx1"/>
+                      </a:solidFill>
+                      <a:prstDash val="solid"/>
+                      <a:round/>
+                      <a:headEnd type="none" w="med" len="med"/>
+                      <a:tailEnd type="none" w="med" len="med"/>
+                    </a:lnB>
+                    <a:lnTlToBr w="12700" cmpd="sng">
+                      <a:noFill/>
+                      <a:prstDash val="solid"/>
+                    </a:lnTlToBr>
+                    <a:lnBlToTr w="12700" cmpd="sng">
+                      <a:noFill/>
+                      <a:prstDash val="solid"/>
+                    </a:lnBlToTr>
+                  </a:tcPr>
+                </a:tc>
+              </a:tr>
+              <a:tr h="275285">
+                <a:tc>
+                  <a:txBody>
+                    <a:bodyPr/>
+                    <a:lstStyle/>
+                    <a:p>
+                      <a:r>
+                        <a:rPr lang="en-US" sz="1200" dirty="0" smtClean="0"/>
+                        <a:t>name</a:t>
+                      </a:r>
+                      <a:endParaRPr lang="en-US" sz="1200" dirty="0"/>
+                    </a:p>
+                  </a:txBody>
+                  <a:tcPr>
+                    <a:lnL w="12700" cap="flat" cmpd="sng" algn="ctr">
+                      <a:solidFill>
+                        <a:schemeClr val="tx1"/>
+                      </a:solidFill>
+                      <a:prstDash val="solid"/>
+                      <a:round/>
+                      <a:headEnd type="none" w="med" len="med"/>
+                      <a:tailEnd type="none" w="med" len="med"/>
+                    </a:lnL>
+                    <a:lnR w="12700" cap="flat" cmpd="sng" algn="ctr">
+                      <a:solidFill>
+                        <a:schemeClr val="tx1"/>
+                      </a:solidFill>
+                      <a:prstDash val="solid"/>
+                      <a:round/>
+                      <a:headEnd type="none" w="med" len="med"/>
+                      <a:tailEnd type="none" w="med" len="med"/>
+                    </a:lnR>
+                    <a:lnT w="12700" cap="flat" cmpd="sng" algn="ctr">
+                      <a:solidFill>
+                        <a:schemeClr val="tx1"/>
+                      </a:solidFill>
+                      <a:prstDash val="solid"/>
+                      <a:round/>
+                      <a:headEnd type="none" w="med" len="med"/>
+                      <a:tailEnd type="none" w="med" len="med"/>
+                    </a:lnT>
+                    <a:lnB w="12700" cap="flat" cmpd="sng" algn="ctr">
+                      <a:solidFill>
+                        <a:schemeClr val="tx1"/>
+                      </a:solidFill>
+                      <a:prstDash val="solid"/>
+                      <a:round/>
+                      <a:headEnd type="none" w="med" len="med"/>
+                      <a:tailEnd type="none" w="med" len="med"/>
+                    </a:lnB>
+                    <a:lnTlToBr w="12700" cmpd="sng">
+                      <a:noFill/>
+                      <a:prstDash val="solid"/>
+                    </a:lnTlToBr>
+                    <a:lnBlToTr w="12700" cmpd="sng">
+                      <a:noFill/>
+                      <a:prstDash val="solid"/>
+                    </a:lnBlToTr>
+                  </a:tcPr>
+                </a:tc>
+              </a:tr>
+              <a:tr h="275285">
+                <a:tc>
+                  <a:txBody>
+                    <a:bodyPr/>
+                    <a:lstStyle/>
+                    <a:p>
+                      <a:r>
+                        <a:rPr lang="en-US" sz="1200" dirty="0" smtClean="0"/>
+                        <a:t>profile</a:t>
+                      </a:r>
+                      <a:endParaRPr lang="en-US" sz="1200" dirty="0"/>
+                    </a:p>
+                  </a:txBody>
+                  <a:tcPr>
+                    <a:lnL w="12700" cap="flat" cmpd="sng" algn="ctr">
+                      <a:solidFill>
+                        <a:schemeClr val="tx1"/>
+                      </a:solidFill>
+                      <a:prstDash val="solid"/>
+                      <a:round/>
+                      <a:headEnd type="none" w="med" len="med"/>
+                      <a:tailEnd type="none" w="med" len="med"/>
+                    </a:lnL>
+                    <a:lnR w="12700" cap="flat" cmpd="sng" algn="ctr">
+                      <a:solidFill>
+                        <a:schemeClr val="tx1"/>
+                      </a:solidFill>
+                      <a:prstDash val="solid"/>
+                      <a:round/>
+                      <a:headEnd type="none" w="med" len="med"/>
+                      <a:tailEnd type="none" w="med" len="med"/>
+                    </a:lnR>
+                    <a:lnT w="12700" cap="flat" cmpd="sng" algn="ctr">
+                      <a:solidFill>
+                        <a:schemeClr val="tx1"/>
+                      </a:solidFill>
+                      <a:prstDash val="solid"/>
+                      <a:round/>
+                      <a:headEnd type="none" w="med" len="med"/>
+                      <a:tailEnd type="none" w="med" len="med"/>
+                    </a:lnT>
+                    <a:lnB w="12700" cap="flat" cmpd="sng" algn="ctr">
+                      <a:solidFill>
+                        <a:schemeClr val="tx1"/>
+                      </a:solidFill>
+                      <a:prstDash val="solid"/>
+                      <a:round/>
+                      <a:headEnd type="none" w="med" len="med"/>
+                      <a:tailEnd type="none" w="med" len="med"/>
+                    </a:lnB>
+                    <a:lnTlToBr w="12700" cmpd="sng">
+                      <a:noFill/>
+                      <a:prstDash val="solid"/>
+                    </a:lnTlToBr>
+                    <a:lnBlToTr w="12700" cmpd="sng">
+                      <a:noFill/>
+                      <a:prstDash val="solid"/>
+                    </a:lnBlToTr>
                   </a:tcPr>
                 </a:tc>
               </a:tr>

</xml_diff>